<commit_message>
Added neural network info
</commit_message>
<xml_diff>
--- a/project/movieML/presentation.pptx
+++ b/project/movieML/presentation.pptx
@@ -13,7 +13,8 @@
     <p:sldId id="278" r:id="rId7"/>
     <p:sldId id="280" r:id="rId8"/>
     <p:sldId id="266" r:id="rId9"/>
-    <p:sldId id="279" r:id="rId10"/>
+    <p:sldId id="282" r:id="rId10"/>
+    <p:sldId id="279" r:id="rId11"/>
   </p:sldIdLst>
   <p:sldSz cx="9144000" cy="6858000" type="screen4x3"/>
   <p:notesSz cx="6858000" cy="9144000"/>
@@ -6800,7 +6801,7 @@
             </a:r>
             <a:r>
               <a:rPr lang="en-US" dirty="0" smtClean="0"/>
-              <a:t>+ Database</a:t>
+              <a:t>+… Database</a:t>
             </a:r>
             <a:endParaRPr lang="en-US" dirty="0"/>
           </a:p>
@@ -6844,6 +6845,92 @@
     <p:extLst>
       <p:ext uri="{BB962C8B-B14F-4D97-AF65-F5344CB8AC3E}">
         <p14:creationId xmlns:p14="http://schemas.microsoft.com/office/powerpoint/2010/main" val="2989116606"/>
+      </p:ext>
+    </p:extLst>
+  </p:cSld>
+  <p:clrMapOvr>
+    <a:masterClrMapping/>
+  </p:clrMapOvr>
+  <p:timing>
+    <p:tnLst>
+      <p:par>
+        <p:cTn xmlns:p14="http://schemas.microsoft.com/office/powerpoint/2010/main" id="1" dur="indefinite" restart="never" nodeType="tmRoot"/>
+      </p:par>
+    </p:tnLst>
+  </p:timing>
+</p:sld>
+</file>
+
+<file path=ppt/slides/slide10.xml><?xml version="1.0" encoding="utf-8"?>
+<p:sld xmlns:a="http://schemas.openxmlformats.org/drawingml/2006/main" xmlns:r="http://schemas.openxmlformats.org/officeDocument/2006/relationships" xmlns:p="http://schemas.openxmlformats.org/presentationml/2006/main">
+  <p:cSld>
+    <p:spTree>
+      <p:nvGrpSpPr>
+        <p:cNvPr id="1" name=""/>
+        <p:cNvGrpSpPr/>
+        <p:nvPr/>
+      </p:nvGrpSpPr>
+      <p:grpSpPr>
+        <a:xfrm>
+          <a:off x="0" y="0"/>
+          <a:ext cx="0" cy="0"/>
+          <a:chOff x="0" y="0"/>
+          <a:chExt cx="0" cy="0"/>
+        </a:xfrm>
+      </p:grpSpPr>
+      <p:sp>
+        <p:nvSpPr>
+          <p:cNvPr id="2" name="Title 1"/>
+          <p:cNvSpPr>
+            <a:spLocks noGrp="1"/>
+          </p:cNvSpPr>
+          <p:nvPr>
+            <p:ph type="title"/>
+          </p:nvPr>
+        </p:nvSpPr>
+        <p:spPr/>
+        <p:txBody>
+          <a:bodyPr/>
+          <a:lstStyle/>
+          <a:p>
+            <a:r>
+              <a:rPr lang="en-US" dirty="0" smtClean="0"/>
+              <a:t>Thanks to</a:t>
+            </a:r>
+            <a:endParaRPr lang="en-US" dirty="0"/>
+          </a:p>
+        </p:txBody>
+      </p:sp>
+      <p:sp>
+        <p:nvSpPr>
+          <p:cNvPr id="3" name="Content Placeholder 2"/>
+          <p:cNvSpPr>
+            <a:spLocks noGrp="1"/>
+          </p:cNvSpPr>
+          <p:nvPr>
+            <p:ph idx="1"/>
+          </p:nvPr>
+        </p:nvSpPr>
+        <p:spPr/>
+        <p:txBody>
+          <a:bodyPr/>
+          <a:lstStyle/>
+          <a:p>
+            <a:pPr marL="0" indent="0">
+              <a:buNone/>
+            </a:pPr>
+            <a:r>
+              <a:rPr lang="en-US" dirty="0" smtClean="0"/>
+              <a:t>u</a:t>
+            </a:r>
+            <a:endParaRPr lang="en-US" dirty="0"/>
+          </a:p>
+        </p:txBody>
+      </p:sp>
+    </p:spTree>
+    <p:extLst>
+      <p:ext uri="{BB962C8B-B14F-4D97-AF65-F5344CB8AC3E}">
+        <p14:creationId xmlns:p14="http://schemas.microsoft.com/office/powerpoint/2010/main" val="2535458016"/>
       </p:ext>
     </p:extLst>
   </p:cSld>
@@ -6963,14 +7050,21 @@
                 <a:latin typeface="Consolas"/>
                 <a:cs typeface="Consolas"/>
               </a:rPr>
-              <a:t>Global Box Office: </a:t>
+              <a:t>Global Box Office: ***</a:t>
             </a:r>
             <a:r>
               <a:rPr lang="en-US" u="sng" dirty="0" smtClean="0">
                 <a:latin typeface="Consolas"/>
                 <a:cs typeface="Consolas"/>
               </a:rPr>
-              <a:t>$38 Billion</a:t>
+              <a:t>$$38 Billion$$</a:t>
+            </a:r>
+            <a:r>
+              <a:rPr lang="en-US" dirty="0" smtClean="0">
+                <a:latin typeface="Consolas"/>
+                <a:cs typeface="Consolas"/>
+              </a:rPr>
+              <a:t>***</a:t>
             </a:r>
           </a:p>
           <a:p>
@@ -7092,6 +7186,85 @@
           </a:bodyPr>
           <a:lstStyle/>
           <a:p>
+            <a:r>
+              <a:rPr lang="en-US" dirty="0" smtClean="0">
+                <a:latin typeface="Consolas"/>
+                <a:cs typeface="Consolas"/>
+              </a:rPr>
+              <a:t>Velocity: Netflix databases </a:t>
+            </a:r>
+            <a:r>
+              <a:rPr lang="en-US" dirty="0" smtClean="0">
+                <a:latin typeface="Consolas"/>
+                <a:cs typeface="Consolas"/>
+              </a:rPr>
+              <a:t>constantly </a:t>
+            </a:r>
+            <a:r>
+              <a:rPr lang="en-US" dirty="0" smtClean="0">
+                <a:latin typeface="Consolas"/>
+                <a:cs typeface="Consolas"/>
+              </a:rPr>
+              <a:t>changing</a:t>
+            </a:r>
+          </a:p>
+          <a:p>
+            <a:r>
+              <a:rPr lang="en-US" dirty="0" smtClean="0">
+                <a:latin typeface="Consolas"/>
+                <a:cs typeface="Consolas"/>
+              </a:rPr>
+              <a:t>Volume: Netflix has 81.5+ million users, see next slide</a:t>
+            </a:r>
+          </a:p>
+          <a:p>
+            <a:r>
+              <a:rPr lang="en-US" dirty="0" smtClean="0">
+                <a:latin typeface="Consolas"/>
+                <a:cs typeface="Consolas"/>
+              </a:rPr>
+              <a:t>Variety: </a:t>
+            </a:r>
+          </a:p>
+          <a:p>
+            <a:pPr lvl="1"/>
+            <a:r>
+              <a:rPr lang="en-US" dirty="0" smtClean="0">
+                <a:latin typeface="Consolas"/>
+                <a:cs typeface="Consolas"/>
+              </a:rPr>
+              <a:t>Web scraping</a:t>
+            </a:r>
+          </a:p>
+          <a:p>
+            <a:pPr lvl="1"/>
+            <a:r>
+              <a:rPr lang="en-US" dirty="0" smtClean="0">
+                <a:latin typeface="Consolas"/>
+                <a:cs typeface="Consolas"/>
+              </a:rPr>
+              <a:t>Public databases</a:t>
+            </a:r>
+          </a:p>
+          <a:p>
+            <a:pPr lvl="1"/>
+            <a:r>
+              <a:rPr lang="en-US" dirty="0" smtClean="0">
+                <a:latin typeface="Consolas"/>
+                <a:cs typeface="Consolas"/>
+              </a:rPr>
+              <a:t>Private databases: user’s ratings</a:t>
+            </a:r>
+          </a:p>
+          <a:p>
+            <a:pPr lvl="1"/>
+            <a:r>
+              <a:rPr lang="en-US" dirty="0" smtClean="0">
+                <a:latin typeface="Consolas"/>
+                <a:cs typeface="Consolas"/>
+              </a:rPr>
+              <a:t>Movie theater listings</a:t>
+            </a:r>
             <a:endParaRPr lang="en-US" dirty="0" smtClean="0">
               <a:latin typeface="Consolas"/>
               <a:cs typeface="Consolas"/>
@@ -7374,7 +7547,14 @@
             <a:pPr lvl="2"/>
             <a:r>
               <a:rPr lang="en-US" dirty="0" smtClean="0"/>
-              <a:t>Slow: 23+ Minutes </a:t>
+              <a:t>Slow: 23+ Minutes</a:t>
+            </a:r>
+          </a:p>
+          <a:p>
+            <a:pPr lvl="1"/>
+            <a:r>
+              <a:rPr lang="en-US" dirty="0" smtClean="0"/>
+              <a:t>Hidden Data </a:t>
             </a:r>
           </a:p>
           <a:p>
@@ -7693,7 +7873,7 @@
             <a:pPr lvl="1"/>
             <a:r>
               <a:rPr lang="en-US" dirty="0" smtClean="0"/>
-              <a:t>Laptop lacked memory &amp; R</a:t>
+              <a:t>Laptop lacked space &amp; R</a:t>
             </a:r>
           </a:p>
           <a:p>
@@ -8192,14 +8372,19 @@
             <p:ph type="title"/>
           </p:nvPr>
         </p:nvSpPr>
-        <p:spPr/>
+        <p:spPr>
+          <a:xfrm>
+            <a:off x="457199" y="342900"/>
+            <a:ext cx="6508377" cy="1143000"/>
+          </a:xfrm>
+        </p:spPr>
         <p:txBody>
           <a:bodyPr/>
           <a:lstStyle/>
           <a:p>
             <a:r>
               <a:rPr lang="en-US" dirty="0" smtClean="0"/>
-              <a:t>Future Research</a:t>
+              <a:t>Neural Networks</a:t>
             </a:r>
             <a:endParaRPr lang="en-US" dirty="0"/>
           </a:p>
@@ -8215,50 +8400,90 @@
             <p:ph idx="1"/>
           </p:nvPr>
         </p:nvSpPr>
-        <p:spPr/>
+        <p:spPr>
+          <a:xfrm>
+            <a:off x="457199" y="1984022"/>
+            <a:ext cx="6508377" cy="3916363"/>
+          </a:xfrm>
+        </p:spPr>
         <p:txBody>
           <a:bodyPr/>
           <a:lstStyle/>
           <a:p>
+            <a:pPr lvl="1"/>
             <a:r>
               <a:rPr lang="en-US" dirty="0" smtClean="0"/>
-              <a:t>Add data sources</a:t>
-            </a:r>
+              <a:t>Used Python’s </a:t>
+            </a:r>
+            <a:r>
+              <a:rPr lang="en-US" dirty="0" err="1" smtClean="0"/>
+              <a:t>scikit-neuralnetwork</a:t>
+            </a:r>
+            <a:endParaRPr lang="en-US" dirty="0" smtClean="0"/>
           </a:p>
           <a:p>
             <a:pPr lvl="1"/>
             <a:r>
               <a:rPr lang="en-US" dirty="0" smtClean="0"/>
-              <a:t>Add movies that are in theaters</a:t>
-            </a:r>
-          </a:p>
-          <a:p>
-            <a:pPr lvl="1"/>
-            <a:r>
-              <a:rPr lang="en-US" dirty="0" smtClean="0"/>
-              <a:t>Add Amazon ratings</a:t>
-            </a:r>
-          </a:p>
-          <a:p>
-            <a:pPr lvl="1"/>
-            <a:r>
-              <a:rPr lang="en-US" dirty="0" err="1" smtClean="0"/>
-              <a:t>Hulu</a:t>
-            </a:r>
-            <a:r>
-              <a:rPr lang="en-US" dirty="0" smtClean="0"/>
-              <a:t>? Private though</a:t>
-            </a:r>
-          </a:p>
-          <a:p>
-            <a:pPr lvl="1"/>
+              <a:t>Root Mean Square Deviation: 0.00037144</a:t>
+            </a:r>
+          </a:p>
+          <a:p>
+            <a:pPr marL="228600" lvl="1" indent="0">
+              <a:buNone/>
+            </a:pPr>
             <a:endParaRPr lang="en-US" dirty="0"/>
           </a:p>
-          <a:p>
-            <a:endParaRPr lang="en-US" dirty="0"/>
-          </a:p>
-        </p:txBody>
-      </p:sp>
+        </p:txBody>
+      </p:sp>
+      <p:pic>
+        <p:nvPicPr>
+          <p:cNvPr id="5" name="Picture 4"/>
+          <p:cNvPicPr>
+            <a:picLocks noChangeAspect="1"/>
+          </p:cNvPicPr>
+          <p:nvPr/>
+        </p:nvPicPr>
+        <p:blipFill>
+          <a:blip r:embed="rId2"/>
+          <a:stretch>
+            <a:fillRect/>
+          </a:stretch>
+        </p:blipFill>
+        <p:spPr>
+          <a:xfrm>
+            <a:off x="4612696" y="3308345"/>
+            <a:ext cx="4203473" cy="2606153"/>
+          </a:xfrm>
+          <a:prstGeom prst="rect">
+            <a:avLst/>
+          </a:prstGeom>
+        </p:spPr>
+      </p:pic>
+      <p:pic>
+        <p:nvPicPr>
+          <p:cNvPr id="6" name="Picture 5"/>
+          <p:cNvPicPr>
+            <a:picLocks noChangeAspect="1"/>
+          </p:cNvPicPr>
+          <p:nvPr/>
+        </p:nvPicPr>
+        <p:blipFill>
+          <a:blip r:embed="rId3"/>
+          <a:stretch>
+            <a:fillRect/>
+          </a:stretch>
+        </p:blipFill>
+        <p:spPr>
+          <a:xfrm>
+            <a:off x="457199" y="3280123"/>
+            <a:ext cx="3944386" cy="2688968"/>
+          </a:xfrm>
+          <a:prstGeom prst="rect">
+            <a:avLst/>
+          </a:prstGeom>
+        </p:spPr>
+      </p:pic>
     </p:spTree>
     <p:extLst>
       <p:ext uri="{BB962C8B-B14F-4D97-AF65-F5344CB8AC3E}">
@@ -8313,7 +8538,7 @@
           <a:p>
             <a:r>
               <a:rPr lang="en-US" dirty="0" smtClean="0"/>
-              <a:t>Thanks to</a:t>
+              <a:t>Future Research</a:t>
             </a:r>
             <a:endParaRPr lang="en-US" dirty="0"/>
           </a:p>
@@ -8334,9 +8559,41 @@
           <a:bodyPr/>
           <a:lstStyle/>
           <a:p>
-            <a:pPr marL="0" indent="0">
-              <a:buNone/>
-            </a:pPr>
+            <a:r>
+              <a:rPr lang="en-US" dirty="0" smtClean="0"/>
+              <a:t>Add data sources</a:t>
+            </a:r>
+          </a:p>
+          <a:p>
+            <a:pPr lvl="1"/>
+            <a:r>
+              <a:rPr lang="en-US" dirty="0" smtClean="0"/>
+              <a:t>Add movies that are in theaters</a:t>
+            </a:r>
+          </a:p>
+          <a:p>
+            <a:pPr lvl="1"/>
+            <a:r>
+              <a:rPr lang="en-US" dirty="0" smtClean="0"/>
+              <a:t>Add Amazon ratings</a:t>
+            </a:r>
+          </a:p>
+          <a:p>
+            <a:pPr lvl="1"/>
+            <a:r>
+              <a:rPr lang="en-US" dirty="0" err="1" smtClean="0"/>
+              <a:t>Hulu</a:t>
+            </a:r>
+            <a:r>
+              <a:rPr lang="en-US" dirty="0" smtClean="0"/>
+              <a:t>? Private though… like most data  D:</a:t>
+            </a:r>
+          </a:p>
+          <a:p>
+            <a:pPr lvl="1"/>
+            <a:endParaRPr lang="en-US" dirty="0"/>
+          </a:p>
+          <a:p>
             <a:endParaRPr lang="en-US" dirty="0"/>
           </a:p>
         </p:txBody>
@@ -8344,7 +8601,7 @@
     </p:spTree>
     <p:extLst>
       <p:ext uri="{BB962C8B-B14F-4D97-AF65-F5344CB8AC3E}">
-        <p14:creationId xmlns:p14="http://schemas.microsoft.com/office/powerpoint/2010/main" val="2535458016"/>
+        <p14:creationId xmlns:p14="http://schemas.microsoft.com/office/powerpoint/2010/main" val="273905933"/>
       </p:ext>
     </p:extLst>
   </p:cSld>

</xml_diff>